<commit_message>
[DHTD-53] presentation and data added
</commit_message>
<xml_diff>
--- a/midterm-presentation/Handout-Midterm.pptx
+++ b/midterm-presentation/Handout-Midterm.pptx
@@ -107,6 +107,11 @@
       </a:defRPr>
     </a:lvl9pPr>
   </p:defaultTextStyle>
+  <p:extLst>
+    <p:ext uri="{EFAFB233-063F-42B5-8137-9DF3F51BA10A}">
+      <p15:sldGuideLst xmlns:p15="http://schemas.microsoft.com/office/powerpoint/2012/main"/>
+    </p:ext>
+  </p:extLst>
 </p:presentation>
 </file>
 
@@ -192,7 +197,7 @@
           <a:p>
             <a:fld id="{FA42B7E7-15B1-44ED-BBDA-7BD98B52DAB8}" type="datetimeFigureOut">
               <a:rPr lang="de-DE" smtClean="0"/>
-              <a:t>07.12.2019</a:t>
+              <a:t>09.12.2019</a:t>
             </a:fld>
             <a:endParaRPr lang="de-DE"/>
           </a:p>
@@ -606,7 +611,7 @@
           <a:p>
             <a:fld id="{DEC8DEED-FDD7-4752-82F5-D13F3FC20113}" type="datetimeFigureOut">
               <a:rPr lang="de-DE" smtClean="0"/>
-              <a:t>07.12.2019</a:t>
+              <a:t>09.12.2019</a:t>
             </a:fld>
             <a:endParaRPr lang="de-DE"/>
           </a:p>
@@ -804,7 +809,7 @@
           <a:p>
             <a:fld id="{DEC8DEED-FDD7-4752-82F5-D13F3FC20113}" type="datetimeFigureOut">
               <a:rPr lang="de-DE" smtClean="0"/>
-              <a:t>07.12.2019</a:t>
+              <a:t>09.12.2019</a:t>
             </a:fld>
             <a:endParaRPr lang="de-DE"/>
           </a:p>
@@ -1012,7 +1017,7 @@
           <a:p>
             <a:fld id="{DEC8DEED-FDD7-4752-82F5-D13F3FC20113}" type="datetimeFigureOut">
               <a:rPr lang="de-DE" smtClean="0"/>
-              <a:t>07.12.2019</a:t>
+              <a:t>09.12.2019</a:t>
             </a:fld>
             <a:endParaRPr lang="de-DE"/>
           </a:p>
@@ -1210,7 +1215,7 @@
           <a:p>
             <a:fld id="{DEC8DEED-FDD7-4752-82F5-D13F3FC20113}" type="datetimeFigureOut">
               <a:rPr lang="de-DE" smtClean="0"/>
-              <a:t>07.12.2019</a:t>
+              <a:t>09.12.2019</a:t>
             </a:fld>
             <a:endParaRPr lang="de-DE"/>
           </a:p>
@@ -1485,7 +1490,7 @@
           <a:p>
             <a:fld id="{DEC8DEED-FDD7-4752-82F5-D13F3FC20113}" type="datetimeFigureOut">
               <a:rPr lang="de-DE" smtClean="0"/>
-              <a:t>07.12.2019</a:t>
+              <a:t>09.12.2019</a:t>
             </a:fld>
             <a:endParaRPr lang="de-DE"/>
           </a:p>
@@ -1750,7 +1755,7 @@
           <a:p>
             <a:fld id="{DEC8DEED-FDD7-4752-82F5-D13F3FC20113}" type="datetimeFigureOut">
               <a:rPr lang="de-DE" smtClean="0"/>
-              <a:t>07.12.2019</a:t>
+              <a:t>09.12.2019</a:t>
             </a:fld>
             <a:endParaRPr lang="de-DE"/>
           </a:p>
@@ -2162,7 +2167,7 @@
           <a:p>
             <a:fld id="{DEC8DEED-FDD7-4752-82F5-D13F3FC20113}" type="datetimeFigureOut">
               <a:rPr lang="de-DE" smtClean="0"/>
-              <a:t>07.12.2019</a:t>
+              <a:t>09.12.2019</a:t>
             </a:fld>
             <a:endParaRPr lang="de-DE"/>
           </a:p>
@@ -2303,7 +2308,7 @@
           <a:p>
             <a:fld id="{DEC8DEED-FDD7-4752-82F5-D13F3FC20113}" type="datetimeFigureOut">
               <a:rPr lang="de-DE" smtClean="0"/>
-              <a:t>07.12.2019</a:t>
+              <a:t>09.12.2019</a:t>
             </a:fld>
             <a:endParaRPr lang="de-DE"/>
           </a:p>
@@ -2416,7 +2421,7 @@
           <a:p>
             <a:fld id="{DEC8DEED-FDD7-4752-82F5-D13F3FC20113}" type="datetimeFigureOut">
               <a:rPr lang="de-DE" smtClean="0"/>
-              <a:t>07.12.2019</a:t>
+              <a:t>09.12.2019</a:t>
             </a:fld>
             <a:endParaRPr lang="de-DE"/>
           </a:p>
@@ -2727,7 +2732,7 @@
           <a:p>
             <a:fld id="{DEC8DEED-FDD7-4752-82F5-D13F3FC20113}" type="datetimeFigureOut">
               <a:rPr lang="de-DE" smtClean="0"/>
-              <a:t>07.12.2019</a:t>
+              <a:t>09.12.2019</a:t>
             </a:fld>
             <a:endParaRPr lang="de-DE"/>
           </a:p>
@@ -3015,7 +3020,7 @@
           <a:p>
             <a:fld id="{DEC8DEED-FDD7-4752-82F5-D13F3FC20113}" type="datetimeFigureOut">
               <a:rPr lang="de-DE" smtClean="0"/>
-              <a:t>07.12.2019</a:t>
+              <a:t>09.12.2019</a:t>
             </a:fld>
             <a:endParaRPr lang="de-DE"/>
           </a:p>
@@ -3256,7 +3261,7 @@
           <a:p>
             <a:fld id="{DEC8DEED-FDD7-4752-82F5-D13F3FC20113}" type="datetimeFigureOut">
               <a:rPr lang="de-DE" smtClean="0"/>
-              <a:t>07.12.2019</a:t>
+              <a:t>09.12.2019</a:t>
             </a:fld>
             <a:endParaRPr lang="de-DE"/>
           </a:p>
@@ -3815,7 +3820,7 @@
         <p:spPr>
           <a:xfrm>
             <a:off x="151418" y="1885362"/>
-            <a:ext cx="5314660" cy="1200329"/>
+            <a:ext cx="5828070" cy="1200329"/>
           </a:xfrm>
           <a:prstGeom prst="rect">
             <a:avLst/>
@@ -3837,21 +3842,21 @@
             </a:br>
             <a:r>
               <a:rPr lang="de-DE" dirty="0"/>
-              <a:t>- Fabian Braun (mail@mail.de)</a:t>
+              <a:t>- Fabian Braun (fabian.braun@dh-towerdefense.de)</a:t>
             </a:r>
             <a:br>
               <a:rPr lang="de-DE" dirty="0"/>
             </a:br>
             <a:r>
               <a:rPr lang="de-DE" dirty="0"/>
-              <a:t>- Luca Rutschmann (mail@mail.de)</a:t>
+              <a:t>- Luca Rutschmann (luca.rutschmann@dh-towerdefense.de)</a:t>
             </a:r>
             <a:br>
               <a:rPr lang="de-DE" dirty="0"/>
             </a:br>
             <a:r>
               <a:rPr lang="de-DE" dirty="0"/>
-              <a:t>- Nicolas Wagner (towerdefense@nicolas-wagner.com)</a:t>
+              <a:t>- Nicolas Wagner (nicolas.wagner@dh-towerdefense.de)</a:t>
             </a:r>
           </a:p>
         </p:txBody>
@@ -3947,7 +3952,7 @@
           <p:nvPr>
             <p:extLst>
               <p:ext uri="{D42A27DB-BD31-4B8C-83A1-F6EECF244321}">
-                <p14:modId xmlns:p14="http://schemas.microsoft.com/office/powerpoint/2010/main" val="1808897670"/>
+                <p14:modId xmlns:p14="http://schemas.microsoft.com/office/powerpoint/2010/main" val="1368063033"/>
               </p:ext>
             </p:extLst>
           </p:nvPr>
@@ -4220,7 +4225,7 @@
                     <a:p>
                       <a:r>
                         <a:rPr lang="de-DE" sz="1000" dirty="0"/>
-                        <a:t>0</a:t>
+                        <a:t>45,75</a:t>
                       </a:r>
                     </a:p>
                   </a:txBody>
@@ -4233,7 +4238,7 @@
                     <a:p>
                       <a:r>
                         <a:rPr lang="de-DE" sz="1000" dirty="0"/>
-                        <a:t>0</a:t>
+                        <a:t>7,25</a:t>
                       </a:r>
                     </a:p>
                   </a:txBody>
@@ -4246,7 +4251,7 @@
                     <a:p>
                       <a:r>
                         <a:rPr lang="de-DE" sz="1000" dirty="0"/>
-                        <a:t>0</a:t>
+                        <a:t>5,75</a:t>
                       </a:r>
                     </a:p>
                   </a:txBody>
@@ -4259,7 +4264,7 @@
                     <a:p>
                       <a:r>
                         <a:rPr lang="de-DE" sz="1000" dirty="0"/>
-                        <a:t>0</a:t>
+                        <a:t>26</a:t>
                       </a:r>
                     </a:p>
                   </a:txBody>
@@ -4272,7 +4277,7 @@
                     <a:p>
                       <a:r>
                         <a:rPr lang="de-DE" sz="1000" dirty="0"/>
-                        <a:t>0</a:t>
+                        <a:t>6,75</a:t>
                       </a:r>
                     </a:p>
                   </a:txBody>
@@ -4325,7 +4330,7 @@
                     <a:p>
                       <a:r>
                         <a:rPr lang="de-DE" sz="1000" dirty="0"/>
-                        <a:t>0</a:t>
+                        <a:t>44,75</a:t>
                       </a:r>
                     </a:p>
                   </a:txBody>
@@ -4338,7 +4343,7 @@
                     <a:p>
                       <a:r>
                         <a:rPr lang="de-DE" sz="1000" dirty="0"/>
-                        <a:t>0</a:t>
+                        <a:t>13,25</a:t>
                       </a:r>
                     </a:p>
                   </a:txBody>
@@ -4351,7 +4356,7 @@
                     <a:p>
                       <a:r>
                         <a:rPr lang="de-DE" sz="1000" dirty="0"/>
-                        <a:t>0</a:t>
+                        <a:t>21,25</a:t>
                       </a:r>
                     </a:p>
                   </a:txBody>
@@ -4364,7 +4369,7 @@
                     <a:p>
                       <a:r>
                         <a:rPr lang="de-DE" sz="1000" dirty="0"/>
-                        <a:t>0</a:t>
+                        <a:t>6,75</a:t>
                       </a:r>
                     </a:p>
                   </a:txBody>
@@ -4377,7 +4382,7 @@
                     <a:p>
                       <a:r>
                         <a:rPr lang="de-DE" sz="1000" dirty="0"/>
-                        <a:t>0</a:t>
+                        <a:t>3,5</a:t>
                       </a:r>
                     </a:p>
                   </a:txBody>
@@ -4439,7 +4444,7 @@
                     <a:p>
                       <a:r>
                         <a:rPr lang="de-DE" sz="1000" dirty="0"/>
-                        <a:t>0</a:t>
+                        <a:t>70,91</a:t>
                       </a:r>
                     </a:p>
                   </a:txBody>
@@ -4462,7 +4467,7 @@
                     <a:p>
                       <a:r>
                         <a:rPr lang="de-DE" sz="1000" dirty="0"/>
-                        <a:t>0</a:t>
+                        <a:t>30,66</a:t>
                       </a:r>
                     </a:p>
                   </a:txBody>
@@ -4485,7 +4490,7 @@
                     <a:p>
                       <a:r>
                         <a:rPr lang="de-DE" sz="1000" dirty="0"/>
-                        <a:t>0</a:t>
+                        <a:t>15,75</a:t>
                       </a:r>
                     </a:p>
                   </a:txBody>
@@ -4508,7 +4513,7 @@
                     <a:p>
                       <a:r>
                         <a:rPr lang="de-DE" sz="1000" dirty="0"/>
-                        <a:t>0</a:t>
+                        <a:t>15,75</a:t>
                       </a:r>
                     </a:p>
                   </a:txBody>
@@ -4531,7 +4536,7 @@
                     <a:p>
                       <a:r>
                         <a:rPr lang="de-DE" sz="1000" dirty="0"/>
-                        <a:t>0</a:t>
+                        <a:t>8,75</a:t>
                       </a:r>
                     </a:p>
                   </a:txBody>
@@ -4581,7 +4586,7 @@
           <p:nvPr>
             <p:extLst>
               <p:ext uri="{D42A27DB-BD31-4B8C-83A1-F6EECF244321}">
-                <p14:modId xmlns:p14="http://schemas.microsoft.com/office/powerpoint/2010/main" val="1709727221"/>
+                <p14:modId xmlns:p14="http://schemas.microsoft.com/office/powerpoint/2010/main" val="1214631539"/>
               </p:ext>
             </p:extLst>
           </p:nvPr>
@@ -4723,7 +4728,7 @@
                     <a:p>
                       <a:r>
                         <a:rPr lang="de-DE" sz="1000" dirty="0"/>
-                        <a:t>0</a:t>
+                        <a:t>51,16</a:t>
                       </a:r>
                     </a:p>
                   </a:txBody>
@@ -4776,7 +4781,7 @@
                     <a:p>
                       <a:r>
                         <a:rPr lang="de-DE" sz="1000" dirty="0"/>
-                        <a:t>0</a:t>
+                        <a:t>42,75</a:t>
                       </a:r>
                     </a:p>
                   </a:txBody>
@@ -4829,7 +4834,7 @@
                     <a:p>
                       <a:r>
                         <a:rPr lang="de-DE" sz="1000" dirty="0"/>
-                        <a:t>0</a:t>
+                        <a:t>48,5</a:t>
                       </a:r>
                     </a:p>
                   </a:txBody>
@@ -4892,7 +4897,7 @@
                     <a:p>
                       <a:r>
                         <a:rPr lang="de-DE" sz="1000" dirty="0"/>
-                        <a:t>0</a:t>
+                        <a:t>19</a:t>
                       </a:r>
                     </a:p>
                   </a:txBody>
@@ -4942,7 +4947,7 @@
           <p:nvPr>
             <p:extLst>
               <p:ext uri="{D42A27DB-BD31-4B8C-83A1-F6EECF244321}">
-                <p14:modId xmlns:p14="http://schemas.microsoft.com/office/powerpoint/2010/main" val="2561514234"/>
+                <p14:modId xmlns:p14="http://schemas.microsoft.com/office/powerpoint/2010/main" val="1096947700"/>
               </p:ext>
             </p:extLst>
           </p:nvPr>
@@ -5104,7 +5109,7 @@
                     <a:p>
                       <a:r>
                         <a:rPr lang="de-DE" sz="1000" dirty="0"/>
-                        <a:t>0</a:t>
+                        <a:t>39</a:t>
                       </a:r>
                     </a:p>
                   </a:txBody>
@@ -5162,7 +5167,7 @@
                     <a:p>
                       <a:r>
                         <a:rPr lang="de-DE" sz="1000" dirty="0"/>
-                        <a:t>0</a:t>
+                        <a:t>7</a:t>
                       </a:r>
                     </a:p>
                   </a:txBody>
@@ -5240,7 +5245,7 @@
                     <a:p>
                       <a:r>
                         <a:rPr lang="de-DE" sz="1000" dirty="0"/>
-                        <a:t>0</a:t>
+                        <a:t>6,5</a:t>
                       </a:r>
                     </a:p>
                   </a:txBody>
@@ -5323,7 +5328,7 @@
                     <a:p>
                       <a:r>
                         <a:rPr lang="de-DE" sz="1000" dirty="0"/>
-                        <a:t>0</a:t>
+                        <a:t>1,5</a:t>
                       </a:r>
                     </a:p>
                   </a:txBody>

</xml_diff>